<commit_message>
BUGFIX: Escape characters in IQ_bullet_list
</commit_message>
<xml_diff>
--- a/tests/testresults/script_IQSlidedeck.pptx
+++ b/tests/testresults/script_IQSlidedeck.pptx
@@ -5789,7 +5789,7 @@
           <a:p>
             <a:r>
               <a:rPr/>
-              <a:t>script_IQSlidedeck.R | Date: 2021-01-11 18:21:08</a:t>
+              <a:t>script_IQSlidedeck.R | Date: 2021-03-09 17:50:18</a:t>
             </a:r>
           </a:p>
         </p:txBody>
@@ -6125,7 +6125,7 @@
           <a:p>
             <a:r>
               <a:rPr/>
-              <a:t>script_IQSlidedeck.R | Date: 2021-01-11 18:21:09</a:t>
+              <a:t>script_IQSlidedeck.R | Date: 2021-03-09 17:50:19</a:t>
             </a:r>
           </a:p>
         </p:txBody>
@@ -6461,7 +6461,7 @@
           <a:p>
             <a:r>
               <a:rPr/>
-              <a:t>script_IQSlidedeck.R | Date: 2021-01-11 18:21:10</a:t>
+              <a:t>script_IQSlidedeck.R | Date: 2021-03-09 17:50:20</a:t>
             </a:r>
           </a:p>
         </p:txBody>
@@ -6625,7 +6625,7 @@
           <a:p>
             <a:r>
               <a:rPr/>
-              <a:t>script_IQSlidedeck.R | Date: 2021-01-11 18:21:07</a:t>
+              <a:t>script_IQSlidedeck.R | Date: 2021-03-09 17:50:17</a:t>
             </a:r>
           </a:p>
         </p:txBody>
@@ -6842,7 +6842,7 @@
           <a:p>
             <a:r>
               <a:rPr/>
-              <a:t>script_IQSlidedeck.R | Date: 2021-01-11 18:21:07</a:t>
+              <a:t>script_IQSlidedeck.R | Date: 2021-03-09 17:50:17</a:t>
             </a:r>
           </a:p>
         </p:txBody>
@@ -6947,7 +6947,7 @@
           <a:p>
             <a:r>
               <a:rPr/>
-              <a:t>script_IQSlidedeck.R | Date: 2021-01-11 18:21:11</a:t>
+              <a:t>script_IQSlidedeck.R | Date: 2021-03-09 17:50:21</a:t>
             </a:r>
           </a:p>
         </p:txBody>
@@ -7052,7 +7052,7 @@
           <a:p>
             <a:r>
               <a:rPr/>
-              <a:t>script_IQSlidedeck.R | Date: 2021-01-11 18:21:12</a:t>
+              <a:t>script_IQSlidedeck.R | Date: 2021-03-09 17:50:22</a:t>
             </a:r>
           </a:p>
         </p:txBody>
@@ -7157,7 +7157,7 @@
           <a:p>
             <a:r>
               <a:rPr/>
-              <a:t>script_IQSlidedeck.R | Date: 2021-01-11 18:21:18</a:t>
+              <a:t>script_IQSlidedeck.R | Date: 2021-03-09 17:50:28</a:t>
             </a:r>
           </a:p>
         </p:txBody>

</xml_diff>

<commit_message>
fixed issue in Daniels favorite call to type.convert.default() :-)
</commit_message>
<xml_diff>
--- a/tests/testresults/script_IQSlidedeck.pptx
+++ b/tests/testresults/script_IQSlidedeck.pptx
@@ -5789,7 +5789,7 @@
           <a:p>
             <a:r>
               <a:rPr/>
-              <a:t>script_IQSlidedeck.R | Date: 2022-03-29 18:35:32</a:t>
+              <a:t>script_IQSlidedeck.R | Date: 2022-03-30 13:33:14</a:t>
             </a:r>
           </a:p>
         </p:txBody>
@@ -6157,7 +6157,7 @@
           <a:p>
             <a:r>
               <a:rPr/>
-              <a:t>script_IQSlidedeck.R | Date: 2022-03-29 18:35:34</a:t>
+              <a:t>script_IQSlidedeck.R | Date: 2022-03-30 13:33:15</a:t>
             </a:r>
           </a:p>
         </p:txBody>
@@ -6525,7 +6525,7 @@
           <a:p>
             <a:r>
               <a:rPr/>
-              <a:t>script_IQSlidedeck.R | Date: 2022-03-29 18:35:35</a:t>
+              <a:t>script_IQSlidedeck.R | Date: 2022-03-30 13:33:16</a:t>
             </a:r>
           </a:p>
         </p:txBody>
@@ -6689,7 +6689,7 @@
           <a:p>
             <a:r>
               <a:rPr/>
-              <a:t>script_IQSlidedeck.R | Date: 2022-03-29 18:35:31</a:t>
+              <a:t>script_IQSlidedeck.R | Date: 2022-03-30 13:33:13</a:t>
             </a:r>
           </a:p>
         </p:txBody>
@@ -6906,7 +6906,7 @@
           <a:p>
             <a:r>
               <a:rPr/>
-              <a:t>script_IQSlidedeck.R | Date: 2022-03-29 18:35:31</a:t>
+              <a:t>script_IQSlidedeck.R | Date: 2022-03-30 13:33:13</a:t>
             </a:r>
           </a:p>
         </p:txBody>
@@ -7011,7 +7011,7 @@
           <a:p>
             <a:r>
               <a:rPr/>
-              <a:t>script_IQSlidedeck.R | Date: 2022-03-29 18:35:36</a:t>
+              <a:t>script_IQSlidedeck.R | Date: 2022-03-30 13:33:17</a:t>
             </a:r>
           </a:p>
         </p:txBody>
@@ -7116,7 +7116,7 @@
           <a:p>
             <a:r>
               <a:rPr/>
-              <a:t>script_IQSlidedeck.R | Date: 2022-03-29 18:35:37</a:t>
+              <a:t>script_IQSlidedeck.R | Date: 2022-03-30 13:33:18</a:t>
             </a:r>
           </a:p>
         </p:txBody>
@@ -7221,7 +7221,7 @@
           <a:p>
             <a:r>
               <a:rPr/>
-              <a:t>script_IQSlidedeck.R | Date: 2022-03-29 18:35:42</a:t>
+              <a:t>script_IQSlidedeck.R | Date: 2022-03-30 13:33:23</a:t>
             </a:r>
           </a:p>
         </p:txBody>

</xml_diff>

<commit_message>
Update IQSlides to the new template
</commit_message>
<xml_diff>
--- a/tests/testresults/script_IQSlidedeck.pptx
+++ b/tests/testresults/script_IQSlidedeck.pptx
@@ -5958,9 +5958,9 @@
           <a:p>
             <a:r>
               <a:rPr/>
-              <a:t>Cars and the time they take to stop
+              <a:t>Cars and the time they take to stop (non-QCed)
 Daniel Kaschek, IntiQuan
-2022-05-17</a:t>
+2023-12-22</a:t>
             </a:r>
           </a:p>
         </p:txBody>
@@ -6098,7 +6098,7 @@
           <a:p>
             <a:r>
               <a:rPr/>
-              <a:t>script_IQSlidedeck.R | Date: 2022-05-17 15:28:26</a:t>
+              <a:t>script_IQSlidedeck.R | Date: 2023-12-22 14:50:27</a:t>
             </a:r>
           </a:p>
         </p:txBody>
@@ -6466,7 +6466,7 @@
           <a:p>
             <a:r>
               <a:rPr/>
-              <a:t>script_IQSlidedeck.R | Date: 2022-05-17 15:28:27</a:t>
+              <a:t>script_IQSlidedeck.R | Date: 2023-12-22 14:50:28</a:t>
             </a:r>
           </a:p>
         </p:txBody>
@@ -6834,7 +6834,7 @@
           <a:p>
             <a:r>
               <a:rPr/>
-              <a:t>script_IQSlidedeck.R | Date: 2022-05-17 15:28:28</a:t>
+              <a:t>script_IQSlidedeck.R | Date: 2023-12-22 14:50:30</a:t>
             </a:r>
           </a:p>
         </p:txBody>
@@ -7024,7 +7024,7 @@
           <a:p>
             <a:r>
               <a:rPr/>
-              <a:t>script_IQSlidedeck.R | Date: 2022-05-17 15:28:35</a:t>
+              <a:t>script_IQSlidedeck.R | Date: 2023-12-22 14:50:39</a:t>
             </a:r>
           </a:p>
         </p:txBody>
@@ -7155,7 +7155,7 @@
           <a:p>
             <a:r>
               <a:rPr/>
-              <a:t>script_IQSlidedeck.R | Date: 2022-05-17 15:28:35</a:t>
+              <a:t>script_IQSlidedeck.R | Date: 2023-12-22 14:50:39</a:t>
             </a:r>
           </a:p>
         </p:txBody>
@@ -7315,7 +7315,7 @@
           <a:p>
             <a:r>
               <a:rPr/>
-              <a:t>script_IQSlidedeck.R | Date: 2022-05-17 15:28:35</a:t>
+              <a:t>script_IQSlidedeck.R | Date: 2023-12-22 14:50:39</a:t>
             </a:r>
           </a:p>
         </p:txBody>
@@ -7453,7 +7453,7 @@
           <a:p>
             <a:r>
               <a:rPr/>
-              <a:t>script_IQSlidedeck.R | Date: 2022-05-17 15:28:35</a:t>
+              <a:t>script_IQSlidedeck.R | Date: 2023-12-22 14:50:39</a:t>
             </a:r>
           </a:p>
         </p:txBody>
@@ -7617,7 +7617,7 @@
           <a:p>
             <a:r>
               <a:rPr/>
-              <a:t>script_IQSlidedeck.R | Date: 2022-05-17 15:28:25</a:t>
+              <a:t>script_IQSlidedeck.R | Date: 2023-12-22 14:50:26</a:t>
             </a:r>
           </a:p>
         </p:txBody>
@@ -7834,7 +7834,7 @@
           <a:p>
             <a:r>
               <a:rPr/>
-              <a:t>script_IQSlidedeck.R | Date: 2022-05-17 15:28:25</a:t>
+              <a:t>script_IQSlidedeck.R | Date: 2023-12-22 14:50:26</a:t>
             </a:r>
           </a:p>
         </p:txBody>
@@ -7939,7 +7939,7 @@
           <a:p>
             <a:r>
               <a:rPr/>
-              <a:t>script_IQSlidedeck.R | Date: 2022-05-17 15:28:29</a:t>
+              <a:t>script_IQSlidedeck.R | Date: 2023-12-22 14:50:30</a:t>
             </a:r>
           </a:p>
         </p:txBody>
@@ -8044,7 +8044,7 @@
           <a:p>
             <a:r>
               <a:rPr/>
-              <a:t>script_IQSlidedeck.R | Date: 2022-05-17 15:28:30</a:t>
+              <a:t>script_IQSlidedeck.R | Date: 2023-12-22 14:50:31</a:t>
             </a:r>
           </a:p>
         </p:txBody>
@@ -8149,7 +8149,7 @@
           <a:p>
             <a:r>
               <a:rPr/>
-              <a:t>script_IQSlidedeck.R | Date: 2022-05-17 15:28:34</a:t>
+              <a:t>script_IQSlidedeck.R | Date: 2023-12-22 14:50:38</a:t>
             </a:r>
           </a:p>
         </p:txBody>

</xml_diff>

<commit_message>
Updates for latest version of IQdesktop
</commit_message>
<xml_diff>
--- a/tests/testresults/script_IQSlidedeck.pptx
+++ b/tests/testresults/script_IQSlidedeck.pptx
@@ -4,7 +4,7 @@
   <p:sldMasterIdLst>
     <p:sldMasterId id="2147483648" r:id="rId1"/>
   </p:sldMasterIdLst>
-  <p:sldIdLst xmlns:a="http://schemas.openxmlformats.org/drawingml/2006/main" xmlns:r="http://schemas.openxmlformats.org/officeDocument/2006/relationships" xmlns:p="http://schemas.openxmlformats.org/presentationml/2006/main">
+  <p:sldIdLst>
     <p:sldId id="256" r:id="rId6"/>
     <p:sldId id="257" r:id="rId7"/>
     <p:sldId id="258" r:id="rId8"/>
@@ -5909,7 +5909,7 @@
           <a:chExt cx="0" cy="0"/>
         </a:xfrm>
       </p:grpSpPr>
-      <p:sp xmlns:a="http://schemas.openxmlformats.org/drawingml/2006/main" xmlns:r="http://schemas.openxmlformats.org/officeDocument/2006/relationships" xmlns:p="http://schemas.openxmlformats.org/presentationml/2006/main">
+      <p:sp>
         <p:nvSpPr>
           <p:cNvPr id="2" name="Title 1"/>
           <p:cNvSpPr>
@@ -5936,7 +5936,7 @@
           </a:p>
         </p:txBody>
       </p:sp>
-      <p:sp xmlns:a="http://schemas.openxmlformats.org/drawingml/2006/main" xmlns:r="http://schemas.openxmlformats.org/officeDocument/2006/relationships" xmlns:p="http://schemas.openxmlformats.org/presentationml/2006/main">
+      <p:sp>
         <p:nvSpPr>
           <p:cNvPr id="3" name="Subtitle 2"/>
           <p:cNvSpPr>
@@ -5960,7 +5960,7 @@
               <a:rPr/>
               <a:t>Cars and the time they take to stop (non-QCed)
 Daniel Kaschek, IntiQuan
-2024-10-25</a:t>
+2025-04-23</a:t>
             </a:r>
           </a:p>
         </p:txBody>
@@ -5990,7 +5990,7 @@
           <a:chExt cx="0" cy="0"/>
         </a:xfrm>
       </p:grpSpPr>
-      <p:sp xmlns:a="http://schemas.openxmlformats.org/drawingml/2006/main" xmlns:r="http://schemas.openxmlformats.org/officeDocument/2006/relationships" xmlns:p="http://schemas.openxmlformats.org/presentationml/2006/main">
+      <p:sp>
         <p:nvSpPr>
           <p:cNvPr id="2" name="Title 1"/>
           <p:cNvSpPr>
@@ -6017,7 +6017,7 @@
           </a:p>
         </p:txBody>
       </p:sp>
-      <p:sp xmlns:a="http://schemas.openxmlformats.org/drawingml/2006/main" xmlns:r="http://schemas.openxmlformats.org/officeDocument/2006/relationships" xmlns:p="http://schemas.openxmlformats.org/presentationml/2006/main">
+      <p:sp>
         <p:nvSpPr>
           <p:cNvPr id="3" name="Content Placeholder 2"/>
           <p:cNvSpPr>
@@ -6050,7 +6050,7 @@
           </a:p>
         </p:txBody>
       </p:sp>
-      <p:pic xmlns:a="http://schemas.openxmlformats.org/drawingml/2006/main" xmlns:r="http://schemas.openxmlformats.org/officeDocument/2006/relationships" xmlns:p="http://schemas.openxmlformats.org/presentationml/2006/main">
+      <p:pic>
         <p:nvPicPr>
           <p:cNvPr id="4" name="Content Placeholder 3" descr=""/>
           <p:cNvPicPr>
@@ -6076,7 +6076,7 @@
           </a:prstGeom>
         </p:spPr>
       </p:pic>
-      <p:sp xmlns:a="http://schemas.openxmlformats.org/drawingml/2006/main" xmlns:r="http://schemas.openxmlformats.org/officeDocument/2006/relationships" xmlns:p="http://schemas.openxmlformats.org/presentationml/2006/main">
+      <p:sp>
         <p:nvSpPr>
           <p:cNvPr id="5" name="Footer Placeholder 5"/>
           <p:cNvSpPr>
@@ -6098,7 +6098,7 @@
           <a:p>
             <a:r>
               <a:rPr/>
-              <a:t>script_IQSlidedeck.R | Date: 2024-10-25 09:13:49</a:t>
+              <a:t>script_IQSlidedeck.R | Date: 2025-04-23 16:52:02.697434</a:t>
             </a:r>
           </a:p>
         </p:txBody>
@@ -6128,7 +6128,7 @@
           <a:chExt cx="0" cy="0"/>
         </a:xfrm>
       </p:grpSpPr>
-      <p:sp xmlns:a="http://schemas.openxmlformats.org/drawingml/2006/main" xmlns:r="http://schemas.openxmlformats.org/officeDocument/2006/relationships" xmlns:p="http://schemas.openxmlformats.org/presentationml/2006/main">
+      <p:sp>
         <p:nvSpPr>
           <p:cNvPr id="2" name="Title 1"/>
           <p:cNvSpPr>
@@ -6155,7 +6155,7 @@
           </a:p>
         </p:txBody>
       </p:sp>
-      <p:sp xmlns:a="http://schemas.openxmlformats.org/drawingml/2006/main" xmlns:r="http://schemas.openxmlformats.org/officeDocument/2006/relationships" xmlns:p="http://schemas.openxmlformats.org/presentationml/2006/main">
+      <p:sp>
         <p:nvSpPr>
           <p:cNvPr id="3" name="Content Placeholder 2"/>
           <p:cNvSpPr>
@@ -6418,7 +6418,7 @@
           </a:p>
         </p:txBody>
       </p:sp>
-      <p:pic xmlns:a="http://schemas.openxmlformats.org/drawingml/2006/main" xmlns:r="http://schemas.openxmlformats.org/officeDocument/2006/relationships" xmlns:p="http://schemas.openxmlformats.org/presentationml/2006/main">
+      <p:pic>
         <p:nvPicPr>
           <p:cNvPr id="4" name="Content Placeholder 3" descr=""/>
           <p:cNvPicPr>
@@ -6444,7 +6444,7 @@
           </a:prstGeom>
         </p:spPr>
       </p:pic>
-      <p:sp xmlns:a="http://schemas.openxmlformats.org/drawingml/2006/main" xmlns:r="http://schemas.openxmlformats.org/officeDocument/2006/relationships" xmlns:p="http://schemas.openxmlformats.org/presentationml/2006/main">
+      <p:sp>
         <p:nvSpPr>
           <p:cNvPr id="5" name="Footer Placeholder 5"/>
           <p:cNvSpPr>
@@ -6466,7 +6466,7 @@
           <a:p>
             <a:r>
               <a:rPr/>
-              <a:t>script_IQSlidedeck.R | Date: 2024-10-25 09:13:51</a:t>
+              <a:t>script_IQSlidedeck.R | Date: 2025-04-23 16:52:03.538924</a:t>
             </a:r>
           </a:p>
         </p:txBody>
@@ -6496,7 +6496,7 @@
           <a:chExt cx="0" cy="0"/>
         </a:xfrm>
       </p:grpSpPr>
-      <p:sp xmlns:a="http://schemas.openxmlformats.org/drawingml/2006/main" xmlns:r="http://schemas.openxmlformats.org/officeDocument/2006/relationships" xmlns:p="http://schemas.openxmlformats.org/presentationml/2006/main">
+      <p:sp>
         <p:nvSpPr>
           <p:cNvPr id="2" name="Title 1"/>
           <p:cNvSpPr>
@@ -6523,7 +6523,7 @@
           </a:p>
         </p:txBody>
       </p:sp>
-      <p:pic xmlns:a="http://schemas.openxmlformats.org/drawingml/2006/main" xmlns:r="http://schemas.openxmlformats.org/officeDocument/2006/relationships" xmlns:p="http://schemas.openxmlformats.org/presentationml/2006/main">
+      <p:pic>
         <p:nvPicPr>
           <p:cNvPr id="3" name="Content Placeholder 2" descr=""/>
           <p:cNvPicPr>
@@ -6549,7 +6549,7 @@
           </a:prstGeom>
         </p:spPr>
       </p:pic>
-      <p:sp xmlns:a="http://schemas.openxmlformats.org/drawingml/2006/main" xmlns:r="http://schemas.openxmlformats.org/officeDocument/2006/relationships" xmlns:p="http://schemas.openxmlformats.org/presentationml/2006/main">
+      <p:sp>
         <p:nvSpPr>
           <p:cNvPr id="4" name="Content Placeholder 3"/>
           <p:cNvSpPr>
@@ -6812,7 +6812,7 @@
           </a:p>
         </p:txBody>
       </p:sp>
-      <p:sp xmlns:a="http://schemas.openxmlformats.org/drawingml/2006/main" xmlns:r="http://schemas.openxmlformats.org/officeDocument/2006/relationships" xmlns:p="http://schemas.openxmlformats.org/presentationml/2006/main">
+      <p:sp>
         <p:nvSpPr>
           <p:cNvPr id="5" name="Footer Placeholder 5"/>
           <p:cNvSpPr>
@@ -6834,7 +6834,7 @@
           <a:p>
             <a:r>
               <a:rPr/>
-              <a:t>script_IQSlidedeck.R | Date: 2024-10-25 09:13:52</a:t>
+              <a:t>script_IQSlidedeck.R | Date: 2025-04-23 16:52:04.421185</a:t>
             </a:r>
           </a:p>
         </p:txBody>
@@ -6864,7 +6864,7 @@
           <a:chExt cx="0" cy="0"/>
         </a:xfrm>
       </p:grpSpPr>
-      <p:sp xmlns:a="http://schemas.openxmlformats.org/drawingml/2006/main" xmlns:r="http://schemas.openxmlformats.org/officeDocument/2006/relationships" xmlns:p="http://schemas.openxmlformats.org/presentationml/2006/main">
+      <p:sp>
         <p:nvSpPr>
           <p:cNvPr id="2" name="Title 1"/>
           <p:cNvSpPr>
@@ -6916,7 +6916,7 @@
           <a:chExt cx="0" cy="0"/>
         </a:xfrm>
       </p:grpSpPr>
-      <p:sp xmlns:a="http://schemas.openxmlformats.org/drawingml/2006/main" xmlns:r="http://schemas.openxmlformats.org/officeDocument/2006/relationships" xmlns:p="http://schemas.openxmlformats.org/presentationml/2006/main">
+      <p:sp>
         <p:nvSpPr>
           <p:cNvPr id="2" name="Title 1"/>
           <p:cNvSpPr>
@@ -6943,7 +6943,7 @@
           </a:p>
         </p:txBody>
       </p:sp>
-      <p:sp xmlns:a="http://schemas.openxmlformats.org/drawingml/2006/main" xmlns:r="http://schemas.openxmlformats.org/officeDocument/2006/relationships" xmlns:p="http://schemas.openxmlformats.org/presentationml/2006/main">
+      <p:sp>
         <p:nvSpPr>
           <p:cNvPr id="3" name="Content Placeholder 2"/>
           <p:cNvSpPr>
@@ -6976,7 +6976,7 @@
           </a:p>
         </p:txBody>
       </p:sp>
-      <p:pic xmlns:a="http://schemas.openxmlformats.org/drawingml/2006/main" xmlns:r="http://schemas.openxmlformats.org/officeDocument/2006/relationships" xmlns:p="http://schemas.openxmlformats.org/presentationml/2006/main">
+      <p:pic>
         <p:nvPicPr>
           <p:cNvPr id="4" name="Content Placeholder 3" descr=""/>
           <p:cNvPicPr>
@@ -7002,7 +7002,7 @@
           </a:prstGeom>
         </p:spPr>
       </p:pic>
-      <p:sp xmlns:a="http://schemas.openxmlformats.org/drawingml/2006/main" xmlns:r="http://schemas.openxmlformats.org/officeDocument/2006/relationships" xmlns:p="http://schemas.openxmlformats.org/presentationml/2006/main">
+      <p:sp>
         <p:nvSpPr>
           <p:cNvPr id="5" name="Footer Placeholder 5"/>
           <p:cNvSpPr>
@@ -7024,7 +7024,7 @@
           <a:p>
             <a:r>
               <a:rPr/>
-              <a:t>script_IQSlidedeck.R | Date: 2024-10-25 09:14:00</a:t>
+              <a:t>script_IQSlidedeck.R | Date: 2025-04-23 16:52:11.97824</a:t>
             </a:r>
           </a:p>
         </p:txBody>
@@ -7054,7 +7054,7 @@
           <a:chExt cx="0" cy="0"/>
         </a:xfrm>
       </p:grpSpPr>
-      <p:sp xmlns:a="http://schemas.openxmlformats.org/drawingml/2006/main" xmlns:r="http://schemas.openxmlformats.org/officeDocument/2006/relationships" xmlns:p="http://schemas.openxmlformats.org/presentationml/2006/main">
+      <p:sp>
         <p:nvSpPr>
           <p:cNvPr id="2" name="Title 1"/>
           <p:cNvSpPr>
@@ -7081,7 +7081,7 @@
           </a:p>
         </p:txBody>
       </p:sp>
-      <p:pic xmlns:a="http://schemas.openxmlformats.org/drawingml/2006/main" xmlns:r="http://schemas.openxmlformats.org/officeDocument/2006/relationships" xmlns:p="http://schemas.openxmlformats.org/presentationml/2006/main">
+      <p:pic>
         <p:nvPicPr>
           <p:cNvPr id="3" name="Content Placeholder 2" descr=""/>
           <p:cNvPicPr>
@@ -7107,7 +7107,7 @@
           </a:prstGeom>
         </p:spPr>
       </p:pic>
-      <p:pic xmlns:a="http://schemas.openxmlformats.org/drawingml/2006/main" xmlns:r="http://schemas.openxmlformats.org/officeDocument/2006/relationships" xmlns:p="http://schemas.openxmlformats.org/presentationml/2006/main">
+      <p:pic>
         <p:nvPicPr>
           <p:cNvPr id="4" name="Content Placeholder 3" descr=""/>
           <p:cNvPicPr>
@@ -7133,7 +7133,7 @@
           </a:prstGeom>
         </p:spPr>
       </p:pic>
-      <p:sp xmlns:a="http://schemas.openxmlformats.org/drawingml/2006/main" xmlns:r="http://schemas.openxmlformats.org/officeDocument/2006/relationships" xmlns:p="http://schemas.openxmlformats.org/presentationml/2006/main">
+      <p:sp>
         <p:nvSpPr>
           <p:cNvPr id="5" name="Footer Placeholder 5"/>
           <p:cNvSpPr>
@@ -7155,7 +7155,7 @@
           <a:p>
             <a:r>
               <a:rPr/>
-              <a:t>script_IQSlidedeck.R | Date: 2024-10-25 09:14:00</a:t>
+              <a:t>script_IQSlidedeck.R | Date: 2025-04-23 16:52:12.011498</a:t>
             </a:r>
           </a:p>
         </p:txBody>
@@ -7185,7 +7185,7 @@
           <a:chExt cx="0" cy="0"/>
         </a:xfrm>
       </p:grpSpPr>
-      <p:sp xmlns:a="http://schemas.openxmlformats.org/drawingml/2006/main" xmlns:r="http://schemas.openxmlformats.org/officeDocument/2006/relationships" xmlns:p="http://schemas.openxmlformats.org/presentationml/2006/main">
+      <p:sp>
         <p:nvSpPr>
           <p:cNvPr id="2" name="Title 1"/>
           <p:cNvSpPr>
@@ -7212,7 +7212,7 @@
           </a:p>
         </p:txBody>
       </p:sp>
-      <p:pic xmlns:a="http://schemas.openxmlformats.org/drawingml/2006/main" xmlns:r="http://schemas.openxmlformats.org/officeDocument/2006/relationships" xmlns:p="http://schemas.openxmlformats.org/presentationml/2006/main">
+      <p:pic>
         <p:nvPicPr>
           <p:cNvPr id="3" name="Content Placeholder 2" descr=""/>
           <p:cNvPicPr>
@@ -7238,7 +7238,7 @@
           </a:prstGeom>
         </p:spPr>
       </p:pic>
-      <p:sp xmlns:a="http://schemas.openxmlformats.org/drawingml/2006/main" xmlns:r="http://schemas.openxmlformats.org/officeDocument/2006/relationships" xmlns:p="http://schemas.openxmlformats.org/presentationml/2006/main">
+      <p:sp>
         <p:nvSpPr>
           <p:cNvPr id="4" name="Content Placeholder 3"/>
           <p:cNvSpPr>
@@ -7293,7 +7293,7 @@
           </a:p>
         </p:txBody>
       </p:sp>
-      <p:sp xmlns:a="http://schemas.openxmlformats.org/drawingml/2006/main" xmlns:r="http://schemas.openxmlformats.org/officeDocument/2006/relationships" xmlns:p="http://schemas.openxmlformats.org/presentationml/2006/main">
+      <p:sp>
         <p:nvSpPr>
           <p:cNvPr id="5" name="Footer Placeholder 5"/>
           <p:cNvSpPr>
@@ -7315,7 +7315,7 @@
           <a:p>
             <a:r>
               <a:rPr/>
-              <a:t>script_IQSlidedeck.R | Date: 2024-10-25 09:14:00</a:t>
+              <a:t>script_IQSlidedeck.R | Date: 2025-04-23 16:52:12.04445</a:t>
             </a:r>
           </a:p>
         </p:txBody>
@@ -7345,7 +7345,7 @@
           <a:chExt cx="0" cy="0"/>
         </a:xfrm>
       </p:grpSpPr>
-      <p:sp xmlns:a="http://schemas.openxmlformats.org/drawingml/2006/main" xmlns:r="http://schemas.openxmlformats.org/officeDocument/2006/relationships" xmlns:p="http://schemas.openxmlformats.org/presentationml/2006/main">
+      <p:sp>
         <p:nvSpPr>
           <p:cNvPr id="2" name="Title 1"/>
           <p:cNvSpPr>
@@ -7372,7 +7372,7 @@
           </a:p>
         </p:txBody>
       </p:sp>
-      <p:sp xmlns:a="http://schemas.openxmlformats.org/drawingml/2006/main" xmlns:r="http://schemas.openxmlformats.org/officeDocument/2006/relationships" xmlns:p="http://schemas.openxmlformats.org/presentationml/2006/main">
+      <p:sp>
         <p:nvSpPr>
           <p:cNvPr id="3" name="Content Placeholder 2"/>
           <p:cNvSpPr>
@@ -7405,7 +7405,7 @@
           </a:p>
         </p:txBody>
       </p:sp>
-      <p:pic xmlns:a="http://schemas.openxmlformats.org/drawingml/2006/main" xmlns:r="http://schemas.openxmlformats.org/officeDocument/2006/relationships" xmlns:p="http://schemas.openxmlformats.org/presentationml/2006/main">
+      <p:pic>
         <p:nvPicPr>
           <p:cNvPr id="4" name="Content Placeholder 3" descr=""/>
           <p:cNvPicPr>
@@ -7431,7 +7431,7 @@
           </a:prstGeom>
         </p:spPr>
       </p:pic>
-      <p:sp xmlns:a="http://schemas.openxmlformats.org/drawingml/2006/main" xmlns:r="http://schemas.openxmlformats.org/officeDocument/2006/relationships" xmlns:p="http://schemas.openxmlformats.org/presentationml/2006/main">
+      <p:sp>
         <p:nvSpPr>
           <p:cNvPr id="5" name="Footer Placeholder 5"/>
           <p:cNvSpPr>
@@ -7453,7 +7453,7 @@
           <a:p>
             <a:r>
               <a:rPr/>
-              <a:t>script_IQSlidedeck.R | Date: 2024-10-25 09:14:00</a:t>
+              <a:t>script_IQSlidedeck.R | Date: 2025-04-23 16:52:12.077639</a:t>
             </a:r>
           </a:p>
         </p:txBody>
@@ -7483,7 +7483,7 @@
           <a:chExt cx="0" cy="0"/>
         </a:xfrm>
       </p:grpSpPr>
-      <p:sp xmlns:a="http://schemas.openxmlformats.org/drawingml/2006/main" xmlns:r="http://schemas.openxmlformats.org/officeDocument/2006/relationships" xmlns:p="http://schemas.openxmlformats.org/presentationml/2006/main">
+      <p:sp>
         <p:nvSpPr>
           <p:cNvPr id="2" name="Title 1"/>
           <p:cNvSpPr>
@@ -7535,7 +7535,7 @@
           <a:chExt cx="0" cy="0"/>
         </a:xfrm>
       </p:grpSpPr>
-      <p:sp xmlns:a="http://schemas.openxmlformats.org/drawingml/2006/main" xmlns:r="http://schemas.openxmlformats.org/officeDocument/2006/relationships" xmlns:p="http://schemas.openxmlformats.org/presentationml/2006/main">
+      <p:sp>
         <p:nvSpPr>
           <p:cNvPr id="2" name="Title 1"/>
           <p:cNvSpPr>
@@ -7562,7 +7562,7 @@
           </a:p>
         </p:txBody>
       </p:sp>
-      <p:sp xmlns:a="http://schemas.openxmlformats.org/drawingml/2006/main" xmlns:r="http://schemas.openxmlformats.org/officeDocument/2006/relationships" xmlns:p="http://schemas.openxmlformats.org/presentationml/2006/main">
+      <p:sp>
         <p:nvSpPr>
           <p:cNvPr id="3" name="Content Placeholder 2"/>
           <p:cNvSpPr>
@@ -7595,7 +7595,7 @@
           </a:p>
         </p:txBody>
       </p:sp>
-      <p:sp xmlns:a="http://schemas.openxmlformats.org/drawingml/2006/main" xmlns:r="http://schemas.openxmlformats.org/officeDocument/2006/relationships" xmlns:p="http://schemas.openxmlformats.org/presentationml/2006/main">
+      <p:sp>
         <p:nvSpPr>
           <p:cNvPr id="4" name="Footer Placeholder 4"/>
           <p:cNvSpPr>
@@ -7617,7 +7617,7 @@
           <a:p>
             <a:r>
               <a:rPr/>
-              <a:t>script_IQSlidedeck.R | Date: 2024-10-25 09:13:48</a:t>
+              <a:t>script_IQSlidedeck.R | Date: 2025-04-23 16:52:01.844054</a:t>
             </a:r>
           </a:p>
         </p:txBody>
@@ -7647,7 +7647,7 @@
           <a:chExt cx="0" cy="0"/>
         </a:xfrm>
       </p:grpSpPr>
-      <p:sp xmlns:a="http://schemas.openxmlformats.org/drawingml/2006/main" xmlns:r="http://schemas.openxmlformats.org/officeDocument/2006/relationships" xmlns:p="http://schemas.openxmlformats.org/presentationml/2006/main">
+      <p:sp>
         <p:nvSpPr>
           <p:cNvPr id="2" name="Title 1"/>
           <p:cNvSpPr>
@@ -7699,7 +7699,7 @@
           <a:chExt cx="0" cy="0"/>
         </a:xfrm>
       </p:grpSpPr>
-      <p:sp xmlns:a="http://schemas.openxmlformats.org/drawingml/2006/main" xmlns:r="http://schemas.openxmlformats.org/officeDocument/2006/relationships" xmlns:p="http://schemas.openxmlformats.org/presentationml/2006/main">
+      <p:sp>
         <p:nvSpPr>
           <p:cNvPr id="2" name="Title 1"/>
           <p:cNvSpPr>
@@ -7726,7 +7726,7 @@
           </a:p>
         </p:txBody>
       </p:sp>
-      <p:sp xmlns:a="http://schemas.openxmlformats.org/drawingml/2006/main" xmlns:r="http://schemas.openxmlformats.org/officeDocument/2006/relationships" xmlns:p="http://schemas.openxmlformats.org/presentationml/2006/main">
+      <p:sp>
         <p:nvSpPr>
           <p:cNvPr id="3" name="Content Placeholder 2"/>
           <p:cNvSpPr>
@@ -7759,7 +7759,7 @@
           </a:p>
         </p:txBody>
       </p:sp>
-      <p:pic xmlns:a="http://schemas.openxmlformats.org/drawingml/2006/main" xmlns:r="http://schemas.openxmlformats.org/officeDocument/2006/relationships" xmlns:p="http://schemas.openxmlformats.org/presentationml/2006/main">
+      <p:pic>
         <p:nvPicPr>
           <p:cNvPr id="4" name="Content Placeholder 3" descr=""/>
           <p:cNvPicPr>
@@ -7785,7 +7785,7 @@
           </a:prstGeom>
         </p:spPr>
       </p:pic>
-      <p:sp xmlns:a="http://schemas.openxmlformats.org/drawingml/2006/main" xmlns:r="http://schemas.openxmlformats.org/officeDocument/2006/relationships" xmlns:p="http://schemas.openxmlformats.org/presentationml/2006/main">
+      <p:sp>
         <p:nvSpPr>
           <p:cNvPr id="5" name="Text Placeholder 2"/>
           <p:cNvSpPr>
@@ -7812,7 +7812,7 @@
           </a:p>
         </p:txBody>
       </p:sp>
-      <p:sp xmlns:a="http://schemas.openxmlformats.org/drawingml/2006/main" xmlns:r="http://schemas.openxmlformats.org/officeDocument/2006/relationships" xmlns:p="http://schemas.openxmlformats.org/presentationml/2006/main">
+      <p:sp>
         <p:nvSpPr>
           <p:cNvPr id="6" name="Footer Placeholder 5"/>
           <p:cNvSpPr>
@@ -7834,7 +7834,7 @@
           <a:p>
             <a:r>
               <a:rPr/>
-              <a:t>script_IQSlidedeck.R | Date: 2024-10-25 09:13:48</a:t>
+              <a:t>script_IQSlidedeck.R | Date: 2025-04-23 16:52:02.007061</a:t>
             </a:r>
           </a:p>
         </p:txBody>
@@ -7864,7 +7864,7 @@
           <a:chExt cx="0" cy="0"/>
         </a:xfrm>
       </p:grpSpPr>
-      <p:sp xmlns:a="http://schemas.openxmlformats.org/drawingml/2006/main" xmlns:r="http://schemas.openxmlformats.org/officeDocument/2006/relationships" xmlns:p="http://schemas.openxmlformats.org/presentationml/2006/main">
+      <p:sp>
         <p:nvSpPr>
           <p:cNvPr id="2" name="Title 1"/>
           <p:cNvSpPr>
@@ -7891,7 +7891,7 @@
           </a:p>
         </p:txBody>
       </p:sp>
-      <p:pic xmlns:a="http://schemas.openxmlformats.org/drawingml/2006/main" xmlns:r="http://schemas.openxmlformats.org/officeDocument/2006/relationships" xmlns:p="http://schemas.openxmlformats.org/presentationml/2006/main">
+      <p:pic>
         <p:nvPicPr>
           <p:cNvPr id="3" name="Content Placeholder 2" descr=""/>
           <p:cNvPicPr>
@@ -7917,7 +7917,7 @@
           </a:prstGeom>
         </p:spPr>
       </p:pic>
-      <p:sp xmlns:a="http://schemas.openxmlformats.org/drawingml/2006/main" xmlns:r="http://schemas.openxmlformats.org/officeDocument/2006/relationships" xmlns:p="http://schemas.openxmlformats.org/presentationml/2006/main">
+      <p:sp>
         <p:nvSpPr>
           <p:cNvPr id="4" name="Footer Placeholder 4"/>
           <p:cNvSpPr>
@@ -7939,7 +7939,7 @@
           <a:p>
             <a:r>
               <a:rPr/>
-              <a:t>script_IQSlidedeck.R | Date: 2024-10-25 09:13:53</a:t>
+              <a:t>script_IQSlidedeck.R | Date: 2025-04-23 16:52:05.054469</a:t>
             </a:r>
           </a:p>
         </p:txBody>
@@ -7969,7 +7969,7 @@
           <a:chExt cx="0" cy="0"/>
         </a:xfrm>
       </p:grpSpPr>
-      <p:sp xmlns:a="http://schemas.openxmlformats.org/drawingml/2006/main" xmlns:r="http://schemas.openxmlformats.org/officeDocument/2006/relationships" xmlns:p="http://schemas.openxmlformats.org/presentationml/2006/main">
+      <p:sp>
         <p:nvSpPr>
           <p:cNvPr id="2" name="Title 1"/>
           <p:cNvSpPr>
@@ -7996,7 +7996,7 @@
           </a:p>
         </p:txBody>
       </p:sp>
-      <p:pic xmlns:a="http://schemas.openxmlformats.org/drawingml/2006/main" xmlns:r="http://schemas.openxmlformats.org/officeDocument/2006/relationships" xmlns:p="http://schemas.openxmlformats.org/presentationml/2006/main">
+      <p:pic>
         <p:nvPicPr>
           <p:cNvPr id="3" name="Content Placeholder 2" descr=""/>
           <p:cNvPicPr>
@@ -8022,7 +8022,7 @@
           </a:prstGeom>
         </p:spPr>
       </p:pic>
-      <p:sp xmlns:a="http://schemas.openxmlformats.org/drawingml/2006/main" xmlns:r="http://schemas.openxmlformats.org/officeDocument/2006/relationships" xmlns:p="http://schemas.openxmlformats.org/presentationml/2006/main">
+      <p:sp>
         <p:nvSpPr>
           <p:cNvPr id="4" name="Footer Placeholder 4"/>
           <p:cNvSpPr>
@@ -8044,7 +8044,7 @@
           <a:p>
             <a:r>
               <a:rPr/>
-              <a:t>script_IQSlidedeck.R | Date: 2024-10-25 09:13:53</a:t>
+              <a:t>script_IQSlidedeck.R | Date: 2025-04-23 16:52:06.064167</a:t>
             </a:r>
           </a:p>
         </p:txBody>
@@ -8074,7 +8074,7 @@
           <a:chExt cx="0" cy="0"/>
         </a:xfrm>
       </p:grpSpPr>
-      <p:sp xmlns:a="http://schemas.openxmlformats.org/drawingml/2006/main" xmlns:r="http://schemas.openxmlformats.org/officeDocument/2006/relationships" xmlns:p="http://schemas.openxmlformats.org/presentationml/2006/main">
+      <p:sp>
         <p:nvSpPr>
           <p:cNvPr id="2" name="Title 1"/>
           <p:cNvSpPr>
@@ -8101,7 +8101,7 @@
           </a:p>
         </p:txBody>
       </p:sp>
-      <p:pic xmlns:a="http://schemas.openxmlformats.org/drawingml/2006/main" xmlns:r="http://schemas.openxmlformats.org/officeDocument/2006/relationships" xmlns:p="http://schemas.openxmlformats.org/presentationml/2006/main">
+      <p:pic>
         <p:nvPicPr>
           <p:cNvPr id="3" name="Content Placeholder 2" descr=""/>
           <p:cNvPicPr>
@@ -8127,7 +8127,7 @@
           </a:prstGeom>
         </p:spPr>
       </p:pic>
-      <p:sp xmlns:a="http://schemas.openxmlformats.org/drawingml/2006/main" xmlns:r="http://schemas.openxmlformats.org/officeDocument/2006/relationships" xmlns:p="http://schemas.openxmlformats.org/presentationml/2006/main">
+      <p:sp>
         <p:nvSpPr>
           <p:cNvPr id="4" name="Footer Placeholder 4"/>
           <p:cNvSpPr>
@@ -8149,7 +8149,7 @@
           <a:p>
             <a:r>
               <a:rPr/>
-              <a:t>script_IQSlidedeck.R | Date: 2024-10-25 09:13:59</a:t>
+              <a:t>script_IQSlidedeck.R | Date: 2025-04-23 16:52:11.532092</a:t>
             </a:r>
           </a:p>
         </p:txBody>
@@ -8179,7 +8179,7 @@
           <a:chExt cx="0" cy="0"/>
         </a:xfrm>
       </p:grpSpPr>
-      <p:sp xmlns:a="http://schemas.openxmlformats.org/drawingml/2006/main" xmlns:r="http://schemas.openxmlformats.org/officeDocument/2006/relationships" xmlns:p="http://schemas.openxmlformats.org/presentationml/2006/main">
+      <p:sp>
         <p:nvSpPr>
           <p:cNvPr id="2" name="Title 1"/>
           <p:cNvSpPr>

</xml_diff>